<commit_message>
Fixed some syntax errors
</commit_message>
<xml_diff>
--- a/04.TestLevelsAndTypes/Suitability.pptx
+++ b/04.TestLevelsAndTypes/Suitability.pptx
@@ -114,7 +114,7 @@
   </p:defaultTextStyle>
   <p:extLst>
     <p:ext uri="{EFAFB233-063F-42B5-8137-9DF3F51BA10A}">
-      <p15:sldGuideLst xmlns:p15="http://schemas.microsoft.com/office/powerpoint/2012/main" xmlns=""/>
+      <p15:sldGuideLst xmlns="" xmlns:p15="http://schemas.microsoft.com/office/powerpoint/2012/main"/>
     </p:ext>
   </p:extLst>
 </p:presentation>
@@ -125,7 +125,7 @@
   <p:cmAuthor id="1" name="Ventsislav Ivanov" initials="VI" lastIdx="2" clrIdx="0">
     <p:extLst>
       <p:ext uri="{19B8F6BF-5375-455C-9EA6-DF929625EA0E}">
-        <p15:presenceInfo xmlns:p15="http://schemas.microsoft.com/office/powerpoint/2012/main" xmlns="" userId="5754ec8a71dc76ed" providerId="Windows Live"/>
+        <p15:presenceInfo xmlns="" xmlns:p15="http://schemas.microsoft.com/office/powerpoint/2012/main" userId="5754ec8a71dc76ed" providerId="Windows Live"/>
       </p:ext>
     </p:extLst>
   </p:cmAuthor>
@@ -878,7 +878,7 @@
             <a:fld id="{B61BEF0D-F0BB-DE4B-95CE-6DB70DBA9567}" type="datetimeFigureOut">
               <a:rPr lang="en-US" dirty="0"/>
               <a:pPr/>
-              <a:t>11/14/2015</a:t>
+              <a:t>11/16/2015</a:t>
             </a:fld>
             <a:endParaRPr lang="en-US" dirty="0"/>
           </a:p>
@@ -1126,7 +1126,7 @@
             <a:fld id="{B61BEF0D-F0BB-DE4B-95CE-6DB70DBA9567}" type="datetimeFigureOut">
               <a:rPr lang="en-US" dirty="0"/>
               <a:pPr/>
-              <a:t>11/14/2015</a:t>
+              <a:t>11/16/2015</a:t>
             </a:fld>
             <a:endParaRPr lang="en-US" dirty="0"/>
           </a:p>
@@ -1437,7 +1437,7 @@
             <a:fld id="{B61BEF0D-F0BB-DE4B-95CE-6DB70DBA9567}" type="datetimeFigureOut">
               <a:rPr lang="en-US" dirty="0"/>
               <a:pPr/>
-              <a:t>11/14/2015</a:t>
+              <a:t>11/16/2015</a:t>
             </a:fld>
             <a:endParaRPr lang="en-US" dirty="0"/>
           </a:p>
@@ -1767,7 +1767,7 @@
             <a:fld id="{B61BEF0D-F0BB-DE4B-95CE-6DB70DBA9567}" type="datetimeFigureOut">
               <a:rPr lang="en-US" dirty="0"/>
               <a:pPr/>
-              <a:t>11/14/2015</a:t>
+              <a:t>11/16/2015</a:t>
             </a:fld>
             <a:endParaRPr lang="en-US" dirty="0"/>
           </a:p>
@@ -2078,7 +2078,7 @@
             <a:fld id="{B61BEF0D-F0BB-DE4B-95CE-6DB70DBA9567}" type="datetimeFigureOut">
               <a:rPr lang="en-US" dirty="0"/>
               <a:pPr/>
-              <a:t>11/14/2015</a:t>
+              <a:t>11/16/2015</a:t>
             </a:fld>
             <a:endParaRPr lang="en-US" dirty="0"/>
           </a:p>
@@ -2468,7 +2468,7 @@
             <a:fld id="{B61BEF0D-F0BB-DE4B-95CE-6DB70DBA9567}" type="datetimeFigureOut">
               <a:rPr lang="en-US" dirty="0"/>
               <a:pPr/>
-              <a:t>11/14/2015</a:t>
+              <a:t>11/16/2015</a:t>
             </a:fld>
             <a:endParaRPr lang="en-US" dirty="0"/>
           </a:p>
@@ -2635,7 +2635,7 @@
             <a:fld id="{55C6B4A9-1611-4792-9094-5F34BCA07E0B}" type="datetimeFigureOut">
               <a:rPr lang="en-US" dirty="0"/>
               <a:pPr/>
-              <a:t>11/14/2015</a:t>
+              <a:t>11/16/2015</a:t>
             </a:fld>
             <a:endParaRPr lang="en-US" dirty="0"/>
           </a:p>
@@ -2812,7 +2812,7 @@
             <a:fld id="{B61BEF0D-F0BB-DE4B-95CE-6DB70DBA9567}" type="datetimeFigureOut">
               <a:rPr lang="en-US" dirty="0"/>
               <a:pPr/>
-              <a:t>11/14/2015</a:t>
+              <a:t>11/16/2015</a:t>
             </a:fld>
             <a:endParaRPr lang="en-US" dirty="0"/>
           </a:p>
@@ -2979,7 +2979,7 @@
             <a:fld id="{42A54C80-263E-416B-A8E0-580EDEADCBDC}" type="datetimeFigureOut">
               <a:rPr lang="en-US" dirty="0"/>
               <a:pPr/>
-              <a:t>11/14/2015</a:t>
+              <a:t>11/16/2015</a:t>
             </a:fld>
             <a:endParaRPr lang="en-US" dirty="0"/>
           </a:p>
@@ -3223,7 +3223,7 @@
             <a:fld id="{B61BEF0D-F0BB-DE4B-95CE-6DB70DBA9567}" type="datetimeFigureOut">
               <a:rPr lang="en-US" dirty="0"/>
               <a:pPr/>
-              <a:t>11/14/2015</a:t>
+              <a:t>11/16/2015</a:t>
             </a:fld>
             <a:endParaRPr lang="en-US" dirty="0"/>
           </a:p>
@@ -3452,7 +3452,7 @@
             <a:fld id="{42A54C80-263E-416B-A8E0-580EDEADCBDC}" type="datetimeFigureOut">
               <a:rPr lang="en-US" dirty="0"/>
               <a:pPr/>
-              <a:t>11/14/2015</a:t>
+              <a:t>11/16/2015</a:t>
             </a:fld>
             <a:endParaRPr lang="en-US" dirty="0"/>
           </a:p>
@@ -3823,7 +3823,7 @@
             <a:fld id="{B61BEF0D-F0BB-DE4B-95CE-6DB70DBA9567}" type="datetimeFigureOut">
               <a:rPr lang="en-US" dirty="0"/>
               <a:pPr/>
-              <a:t>11/14/2015</a:t>
+              <a:t>11/16/2015</a:t>
             </a:fld>
             <a:endParaRPr lang="en-US" dirty="0"/>
           </a:p>
@@ -3943,7 +3943,7 @@
             <a:fld id="{B61BEF0D-F0BB-DE4B-95CE-6DB70DBA9567}" type="datetimeFigureOut">
               <a:rPr lang="en-US" dirty="0"/>
               <a:pPr/>
-              <a:t>11/14/2015</a:t>
+              <a:t>11/16/2015</a:t>
             </a:fld>
             <a:endParaRPr lang="en-US" dirty="0"/>
           </a:p>
@@ -4035,7 +4035,7 @@
             <a:fld id="{B61BEF0D-F0BB-DE4B-95CE-6DB70DBA9567}" type="datetimeFigureOut">
               <a:rPr lang="en-US" dirty="0"/>
               <a:pPr/>
-              <a:t>11/14/2015</a:t>
+              <a:t>11/16/2015</a:t>
             </a:fld>
             <a:endParaRPr lang="en-US" dirty="0"/>
           </a:p>
@@ -4287,7 +4287,7 @@
             <a:fld id="{42A54C80-263E-416B-A8E0-580EDEADCBDC}" type="datetimeFigureOut">
               <a:rPr lang="en-US" dirty="0"/>
               <a:pPr/>
-              <a:t>11/14/2015</a:t>
+              <a:t>11/16/2015</a:t>
             </a:fld>
             <a:endParaRPr lang="en-US" dirty="0"/>
           </a:p>
@@ -4590,7 +4590,7 @@
             <a:fld id="{B61BEF0D-F0BB-DE4B-95CE-6DB70DBA9567}" type="datetimeFigureOut">
               <a:rPr lang="en-US" dirty="0"/>
               <a:pPr/>
-              <a:t>11/14/2015</a:t>
+              <a:t>11/16/2015</a:t>
             </a:fld>
             <a:endParaRPr lang="en-US" dirty="0"/>
           </a:p>
@@ -5288,7 +5288,7 @@
             <a:fld id="{B61BEF0D-F0BB-DE4B-95CE-6DB70DBA9567}" type="datetimeFigureOut">
               <a:rPr lang="en-US" dirty="0"/>
               <a:pPr/>
-              <a:t>11/14/2015</a:t>
+              <a:t>11/16/2015</a:t>
             </a:fld>
             <a:endParaRPr lang="en-US" dirty="0"/>
           </a:p>
@@ -5847,19 +5847,7 @@
             </a:br>
             <a:r>
               <a:rPr lang="en-US" sz="5300" dirty="0" smtClean="0"/>
-              <a:t>Quality Attributes for </a:t>
-            </a:r>
-            <a:r>
-              <a:rPr lang="en-US" sz="5300" dirty="0" smtClean="0"/>
-              <a:t>Domain</a:t>
-            </a:r>
-            <a:r>
-              <a:rPr lang="en-US" sz="5300" dirty="0" smtClean="0"/>
-              <a:t> </a:t>
-            </a:r>
-            <a:r>
-              <a:rPr lang="en-US" sz="5300" dirty="0" smtClean="0"/>
-              <a:t>Testing</a:t>
+              <a:t>Quality Attributes for Domain Testing</a:t>
             </a:r>
             <a:r>
               <a:rPr lang="en-US" dirty="0"/>
@@ -5927,7 +5915,7 @@
           <a:blip r:embed="rId2">
             <a:extLst>
               <a:ext uri="{28A0092B-C50C-407E-A947-70E740481C1C}">
-                <a14:useLocalDpi xmlns:a14="http://schemas.microsoft.com/office/drawing/2010/main" xmlns="" val="0"/>
+                <a14:useLocalDpi xmlns="" xmlns:a14="http://schemas.microsoft.com/office/drawing/2010/main" val="0"/>
               </a:ext>
             </a:extLst>
           </a:blip>
@@ -5974,7 +5962,7 @@
     </p:spTree>
     <p:extLst>
       <p:ext uri="{BB962C8B-B14F-4D97-AF65-F5344CB8AC3E}">
-        <p14:creationId xmlns:p14="http://schemas.microsoft.com/office/powerpoint/2010/main" xmlns="" val="2240951106"/>
+        <p14:creationId xmlns="" xmlns:p14="http://schemas.microsoft.com/office/powerpoint/2010/main" val="2240951106"/>
       </p:ext>
     </p:extLst>
   </p:cSld>
@@ -6059,13 +6047,8 @@
             <a:pPr algn="just"/>
             <a:r>
               <a:rPr lang="en-US" sz="2800" dirty="0" smtClean="0"/>
-              <a:t>Suitability is the </a:t>
-            </a:r>
-            <a:r>
-              <a:rPr lang="en-US" sz="2800" dirty="0" smtClean="0"/>
-              <a:t>capability of the software product to provide an appropriate set of functions for specified tasks and user objectives.</a:t>
-            </a:r>
-            <a:endParaRPr lang="en-US" sz="2800" dirty="0" smtClean="0"/>
+              <a:t>Suitability is the capability of the software product to provide an appropriate set of functions for specified tasks and user objectives.</a:t>
+            </a:r>
           </a:p>
           <a:p>
             <a:pPr marL="0" indent="0">
@@ -6118,7 +6101,7 @@
     </p:spTree>
     <p:extLst>
       <p:ext uri="{BB962C8B-B14F-4D97-AF65-F5344CB8AC3E}">
-        <p14:creationId xmlns:p14="http://schemas.microsoft.com/office/powerpoint/2010/main" xmlns="" val="36069602"/>
+        <p14:creationId xmlns="" xmlns:p14="http://schemas.microsoft.com/office/powerpoint/2010/main" val="36069602"/>
       </p:ext>
     </p:extLst>
   </p:cSld>
@@ -6179,19 +6162,7 @@
             </a:pPr>
             <a:r>
               <a:rPr lang="en-US" sz="3200" dirty="0" smtClean="0"/>
-              <a:t>Suitability testing requires knowledge of the </a:t>
-            </a:r>
-            <a:r>
-              <a:rPr lang="en-US" sz="3200" dirty="0" smtClean="0"/>
-              <a:t>intended and </a:t>
-            </a:r>
-            <a:r>
-              <a:rPr lang="en-US" sz="3200" dirty="0" smtClean="0"/>
-              <a:t>expected </a:t>
-            </a:r>
-            <a:r>
-              <a:rPr lang="en-US" sz="3200" dirty="0" smtClean="0"/>
-              <a:t>use</a:t>
+              <a:t>Suitability testing requires knowledge of the intended and expected use</a:t>
             </a:r>
           </a:p>
           <a:p>
@@ -6214,11 +6185,6 @@
               </a:rPr>
               <a:t>need</a:t>
             </a:r>
-            <a:endParaRPr lang="en-US" sz="2200" dirty="0" smtClean="0">
-              <a:solidFill>
-                <a:srgbClr val="FFC000"/>
-              </a:solidFill>
-            </a:endParaRPr>
           </a:p>
           <a:p>
             <a:pPr lvl="4"/>
@@ -6234,11 +6200,6 @@
               </a:rPr>
               <a:t>skill level</a:t>
             </a:r>
-            <a:endParaRPr lang="en-US" sz="2200" dirty="0" smtClean="0">
-              <a:solidFill>
-                <a:srgbClr val="FFC000"/>
-              </a:solidFill>
-            </a:endParaRPr>
           </a:p>
           <a:p>
             <a:pPr lvl="4"/>
@@ -6283,7 +6244,19 @@
             <a:pPr marL="0" lvl="1" indent="0"/>
             <a:r>
               <a:rPr lang="en-US" sz="2400" dirty="0" smtClean="0"/>
-              <a:t>Don’t know? - </a:t>
+              <a:t>Don’t know? </a:t>
+            </a:r>
+            <a:r>
+              <a:rPr lang="en-US" sz="2400" dirty="0" smtClean="0"/>
+              <a:t>– </a:t>
+            </a:r>
+            <a:r>
+              <a:rPr lang="en-US" sz="2400" smtClean="0">
+                <a:solidFill>
+                  <a:srgbClr val="FFC000"/>
+                </a:solidFill>
+              </a:rPr>
+              <a:t>Ferret it </a:t>
             </a:r>
             <a:r>
               <a:rPr lang="en-US" sz="2400" dirty="0" smtClean="0">
@@ -6291,7 +6264,7 @@
                   <a:srgbClr val="FFC000"/>
                 </a:solidFill>
               </a:rPr>
-              <a:t>Ferreted out</a:t>
+              <a:t>out</a:t>
             </a:r>
           </a:p>
           <a:p>
@@ -6367,7 +6340,7 @@
     </p:spTree>
     <p:extLst>
       <p:ext uri="{BB962C8B-B14F-4D97-AF65-F5344CB8AC3E}">
-        <p14:creationId xmlns:p14="http://schemas.microsoft.com/office/powerpoint/2010/main" xmlns="" val="2510236076"/>
+        <p14:creationId xmlns="" xmlns:p14="http://schemas.microsoft.com/office/powerpoint/2010/main" val="2510236076"/>
       </p:ext>
     </p:extLst>
   </p:cSld>
@@ -6459,7 +6432,6 @@
               <a:rPr lang="en-US" sz="2800" dirty="0" smtClean="0"/>
               <a:t>Example</a:t>
             </a:r>
-            <a:endParaRPr lang="en-US" sz="2800" dirty="0" smtClean="0"/>
           </a:p>
         </p:txBody>
       </p:sp>
@@ -6495,15 +6467,7 @@
                   <a:srgbClr val="00B0F0"/>
                 </a:solidFill>
               </a:rPr>
-              <a:t>Normal </a:t>
-            </a:r>
-            <a:r>
-              <a:rPr lang="en-US" sz="2800" dirty="0" smtClean="0">
-                <a:solidFill>
-                  <a:srgbClr val="00B0F0"/>
-                </a:solidFill>
-              </a:rPr>
-              <a:t>workflow</a:t>
+              <a:t>Normal workflow</a:t>
             </a:r>
           </a:p>
           <a:p>
@@ -6539,7 +6503,15 @@
             </a:pPr>
             <a:r>
               <a:rPr lang="en-US" sz="2400" dirty="0" smtClean="0"/>
-              <a:t>System gathers address, payment, and shipping information from Customer</a:t>
+              <a:t>System gathers address, </a:t>
+            </a:r>
+            <a:r>
+              <a:rPr lang="en-US" sz="2400" dirty="0" smtClean="0"/>
+              <a:t>payment </a:t>
+            </a:r>
+            <a:r>
+              <a:rPr lang="en-US" sz="2400" dirty="0" smtClean="0"/>
+              <a:t>and shipping information from Customer</a:t>
             </a:r>
           </a:p>
           <a:p>
@@ -6623,7 +6595,7 @@
     </p:spTree>
     <p:extLst>
       <p:ext uri="{BB962C8B-B14F-4D97-AF65-F5344CB8AC3E}">
-        <p14:creationId xmlns:p14="http://schemas.microsoft.com/office/powerpoint/2010/main" xmlns="" val="3419869146"/>
+        <p14:creationId xmlns="" xmlns:p14="http://schemas.microsoft.com/office/powerpoint/2010/main" val="3419869146"/>
       </p:ext>
     </p:extLst>
   </p:cSld>
@@ -6701,15 +6673,7 @@
                   <a:schemeClr val="tx2"/>
                 </a:solidFill>
               </a:rPr>
-              <a:t>A </a:t>
-            </a:r>
-            <a:r>
-              <a:rPr lang="en-US" sz="2800" dirty="0" smtClean="0">
-                <a:solidFill>
-                  <a:schemeClr val="tx2"/>
-                </a:solidFill>
-              </a:rPr>
-              <a:t>test case for the normal workflow can be:</a:t>
+              <a:t>A test case for the normal workflow can be:</a:t>
             </a:r>
           </a:p>
           <a:p>
@@ -8224,7 +8188,7 @@
     </p:spTree>
     <p:extLst>
       <p:ext uri="{BB962C8B-B14F-4D97-AF65-F5344CB8AC3E}">
-        <p14:creationId xmlns:p14="http://schemas.microsoft.com/office/powerpoint/2010/main" xmlns="" val="3159869396"/>
+        <p14:creationId xmlns="" xmlns:p14="http://schemas.microsoft.com/office/powerpoint/2010/main" val="3159869396"/>
       </p:ext>
     </p:extLst>
   </p:cSld>
@@ -8302,15 +8266,7 @@
                   <a:schemeClr val="tx2"/>
                 </a:solidFill>
               </a:rPr>
-              <a:t>An </a:t>
-            </a:r>
-            <a:r>
-              <a:rPr lang="en-US" sz="2800" dirty="0" smtClean="0">
-                <a:solidFill>
-                  <a:schemeClr val="tx2"/>
-                </a:solidFill>
-              </a:rPr>
-              <a:t>exceptional test case can be:</a:t>
+              <a:t>An exceptional test case can be:</a:t>
             </a:r>
           </a:p>
           <a:p>
@@ -9849,7 +9805,7 @@
     </p:spTree>
     <p:extLst>
       <p:ext uri="{BB962C8B-B14F-4D97-AF65-F5344CB8AC3E}">
-        <p14:creationId xmlns:p14="http://schemas.microsoft.com/office/powerpoint/2010/main" xmlns="" val="3937943436"/>
+        <p14:creationId xmlns="" xmlns:p14="http://schemas.microsoft.com/office/powerpoint/2010/main" val="3937943436"/>
       </p:ext>
     </p:extLst>
   </p:cSld>
@@ -9988,21 +9944,8 @@
                   <a:schemeClr val="tx2"/>
                 </a:solidFill>
               </a:rPr>
-              <a:t>End </a:t>
-            </a:r>
-            <a:r>
-              <a:rPr lang="en-US" sz="2800" dirty="0" smtClean="0">
-                <a:solidFill>
-                  <a:schemeClr val="tx2"/>
-                </a:solidFill>
-              </a:rPr>
-              <a:t>of the integration testing </a:t>
-            </a:r>
-            <a:endParaRPr lang="en-US" sz="2800" dirty="0" smtClean="0">
-              <a:solidFill>
-                <a:schemeClr val="tx2"/>
-              </a:solidFill>
-            </a:endParaRPr>
+              <a:t>End of the integration testing </a:t>
+            </a:r>
           </a:p>
           <a:p>
             <a:pPr marL="0" indent="0"/>
@@ -10020,31 +9963,7 @@
                   <a:schemeClr val="tx2"/>
                 </a:solidFill>
               </a:rPr>
-              <a:t>D</a:t>
-            </a:r>
-            <a:r>
-              <a:rPr lang="en-US" sz="2800" dirty="0" smtClean="0">
-                <a:solidFill>
-                  <a:schemeClr val="tx2"/>
-                </a:solidFill>
-              </a:rPr>
-              <a:t>uring </a:t>
-            </a:r>
-            <a:r>
-              <a:rPr lang="en-US" sz="2800" dirty="0" smtClean="0">
-                <a:solidFill>
-                  <a:schemeClr val="tx2"/>
-                </a:solidFill>
-              </a:rPr>
-              <a:t>system </a:t>
-            </a:r>
-            <a:r>
-              <a:rPr lang="en-US" sz="2800" dirty="0" smtClean="0">
-                <a:solidFill>
-                  <a:schemeClr val="tx2"/>
-                </a:solidFill>
-              </a:rPr>
-              <a:t>testing</a:t>
+              <a:t>During system testing</a:t>
             </a:r>
           </a:p>
           <a:p>
@@ -10086,7 +10005,7 @@
     </p:spTree>
     <p:extLst>
       <p:ext uri="{BB962C8B-B14F-4D97-AF65-F5344CB8AC3E}">
-        <p14:creationId xmlns:p14="http://schemas.microsoft.com/office/powerpoint/2010/main" xmlns="" val="55734661"/>
+        <p14:creationId xmlns="" xmlns:p14="http://schemas.microsoft.com/office/powerpoint/2010/main" val="55734661"/>
       </p:ext>
     </p:extLst>
   </p:cSld>
@@ -10276,15 +10195,7 @@
             </a:pPr>
             <a:r>
               <a:rPr lang="en-US" sz="2400" dirty="0" smtClean="0"/>
-              <a:t>Involved </a:t>
-            </a:r>
-            <a:r>
-              <a:rPr lang="en-US" sz="2400" dirty="0" smtClean="0"/>
-              <a:t>User or Product </a:t>
-            </a:r>
-            <a:r>
-              <a:rPr lang="en-US" sz="2400" dirty="0" smtClean="0"/>
-              <a:t>Owner</a:t>
+              <a:t>Involved User or Product Owner</a:t>
             </a:r>
           </a:p>
           <a:p>
@@ -10325,7 +10236,7 @@
     </p:spTree>
     <p:extLst>
       <p:ext uri="{BB962C8B-B14F-4D97-AF65-F5344CB8AC3E}">
-        <p14:creationId xmlns:p14="http://schemas.microsoft.com/office/powerpoint/2010/main" xmlns="" val="2592513438"/>
+        <p14:creationId xmlns="" xmlns:p14="http://schemas.microsoft.com/office/powerpoint/2010/main" val="2592513438"/>
       </p:ext>
     </p:extLst>
   </p:cSld>
@@ -10393,7 +10304,7 @@
     </p:spTree>
     <p:extLst>
       <p:ext uri="{BB962C8B-B14F-4D97-AF65-F5344CB8AC3E}">
-        <p14:creationId xmlns:p14="http://schemas.microsoft.com/office/powerpoint/2010/main" xmlns="" val="2405888014"/>
+        <p14:creationId xmlns="" xmlns:p14="http://schemas.microsoft.com/office/powerpoint/2010/main" val="2405888014"/>
       </p:ext>
     </p:extLst>
   </p:cSld>
@@ -10661,7 +10572,7 @@
   <a:extraClrSchemeLst/>
   <a:extLst>
     <a:ext uri="{05A4C25C-085E-4340-85A3-A5531E510DB2}">
-      <thm15:themeFamily xmlns:thm15="http://schemas.microsoft.com/office/thememl/2012/main" xmlns="" name="Facet" id="{C0C680CD-088A-49FC-A102-D699147F32B2}" vid="{0B5AB586-D108-4FC1-8368-649FE654B894}"/>
+      <thm15:themeFamily xmlns="" xmlns:thm15="http://schemas.microsoft.com/office/thememl/2012/main" name="Facet" id="{C0C680CD-088A-49FC-A102-D699147F32B2}" vid="{0B5AB586-D108-4FC1-8368-649FE654B894}"/>
     </a:ext>
   </a:extLst>
 </a:theme>

</xml_diff>